<commit_message>
supplementary/deferred exam topics updated
</commit_message>
<xml_diff>
--- a/Lectures2025/CITS5503APIGateway_week12.pptx
+++ b/Lectures2025/CITS5503APIGateway_week12.pptx
@@ -20014,7 +20014,7 @@
             </a:r>
             <a:r>
               <a:rPr lang="en-US" altLang="zh-CN" sz="2000" dirty="0"/>
-              <a:t>question related to code and it will be Lab 5. </a:t>
+              <a:t>question related to code and it will be in Lab 5. </a:t>
             </a:r>
             <a:endParaRPr lang="en-US" sz="2000" dirty="0"/>
           </a:p>
@@ -20146,7 +20146,7 @@
                 <a:ea typeface="+mj-ea"/>
                 <a:cs typeface="+mj-cs"/>
               </a:rPr>
-              <a:t>TBA</a:t>
+              <a:t>Same as those in the previous slide.</a:t>
             </a:r>
           </a:p>
         </p:txBody>
@@ -20583,17 +20583,16 @@
             </a:r>
             <a:r>
               <a:rPr lang="en-US" sz="2000" dirty="0"/>
-              <a:t> Screenshots from the step-by-step demos and toy examples in the lectures above are not part of the exams.</a:t>
-            </a:r>
-          </a:p>
-          <a:p>
-            <a:pPr fontAlgn="auto">
-              <a:spcAft>
-                <a:spcPts val="0"/>
-              </a:spcAft>
-              <a:buClrTx/>
-              <a:buSzTx/>
-            </a:pPr>
+              <a:t> Screenshots from the step-by-step demos and AWS examples in the lectures above are not part of the exam.</a:t>
+            </a:r>
+            <a:r>
+              <a:rPr lang="en-AU" sz="2000" dirty="0"/>
+              <a:t> There is only one </a:t>
+            </a:r>
+            <a:r>
+              <a:rPr lang="en-US" altLang="zh-CN" sz="2000" dirty="0"/>
+              <a:t>question related to code and it will be in Lab 5. </a:t>
+            </a:r>
             <a:endParaRPr lang="en-US" sz="2000" dirty="0"/>
           </a:p>
           <a:p>

</xml_diff>